<commit_message>
Added gradle build tools
</commit_message>
<xml_diff>
--- a/lesson-8/Students materials - 8 - Testing Web Applications with Webdriver.pptx
+++ b/lesson-8/Students materials - 8 - Testing Web Applications with Webdriver.pptx
@@ -5,10 +5,10 @@
     <p:sldMasterId id="2147483669" r:id="rId5"/>
   </p:sldMasterIdLst>
   <p:notesMasterIdLst>
-    <p:notesMasterId r:id="rId18"/>
+    <p:notesMasterId r:id="rId17"/>
   </p:notesMasterIdLst>
   <p:handoutMasterIdLst>
-    <p:handoutMasterId r:id="rId19"/>
+    <p:handoutMasterId r:id="rId18"/>
   </p:handoutMasterIdLst>
   <p:sldIdLst>
     <p:sldId id="286" r:id="rId6"/>
@@ -19,10 +19,9 @@
     <p:sldId id="341" r:id="rId11"/>
     <p:sldId id="347" r:id="rId12"/>
     <p:sldId id="342" r:id="rId13"/>
-    <p:sldId id="348" r:id="rId14"/>
-    <p:sldId id="349" r:id="rId15"/>
-    <p:sldId id="343" r:id="rId16"/>
-    <p:sldId id="324" r:id="rId17"/>
+    <p:sldId id="349" r:id="rId14"/>
+    <p:sldId id="343" r:id="rId15"/>
+    <p:sldId id="324" r:id="rId16"/>
   </p:sldIdLst>
   <p:sldSz cx="9144000" cy="5143500" type="screen16x9"/>
   <p:notesSz cx="6858000" cy="9144000"/>
@@ -249,7 +248,7 @@
             <a:fld id="{C4843D26-F355-3844-A4EF-19D4FD875597}" type="datetimeFigureOut">
               <a:rPr lang="de-DE" smtClean="0"/>
               <a:pPr/>
-              <a:t>26.11.2015</a:t>
+              <a:t>27.11.2015</a:t>
             </a:fld>
             <a:endParaRPr lang="de-DE" dirty="0"/>
           </a:p>
@@ -417,7 +416,7 @@
             <a:fld id="{8E2CFE12-C1FB-D740-8B6C-AFB72D5D4002}" type="datetimeFigureOut">
               <a:rPr lang="de-DE" smtClean="0"/>
               <a:pPr/>
-              <a:t>26.11.2015</a:t>
+              <a:t>27.11.2015</a:t>
             </a:fld>
             <a:endParaRPr lang="de-DE" dirty="0"/>
           </a:p>
@@ -2503,7 +2502,7 @@
           <a:graphicData uri="http://schemas.openxmlformats.org/presentationml/2006/ole">
             <mc:AlternateContent xmlns:mc="http://schemas.openxmlformats.org/markup-compatibility/2006">
               <mc:Choice xmlns:v="urn:schemas-microsoft-com:vml" Requires="v">
-                <p:oleObj spid="_x0000_s2116" name="think-cell Folie" r:id="rId4" imgW="305" imgH="303" progId="TCLayout.ActiveDocument.1">
+                <p:oleObj spid="_x0000_s2119" name="think-cell Folie" r:id="rId4" imgW="305" imgH="303" progId="TCLayout.ActiveDocument.1">
                   <p:embed/>
                 </p:oleObj>
               </mc:Choice>
@@ -2900,7 +2899,7 @@
           <a:graphicData uri="http://schemas.openxmlformats.org/presentationml/2006/ole">
             <mc:AlternateContent xmlns:mc="http://schemas.openxmlformats.org/markup-compatibility/2006">
               <mc:Choice xmlns:v="urn:schemas-microsoft-com:vml" Requires="v">
-                <p:oleObj spid="_x0000_s1096" name="think-cell Folie" r:id="rId13" imgW="305" imgH="303" progId="TCLayout.ActiveDocument.1">
+                <p:oleObj spid="_x0000_s1099" name="think-cell Folie" r:id="rId13" imgW="305" imgH="303" progId="TCLayout.ActiveDocument.1">
                   <p:embed/>
                 </p:oleObj>
               </mc:Choice>
@@ -4294,459 +4293,6 @@
           <a:lstStyle/>
           <a:p>
             <a:r>
-              <a:rPr lang="pl-PL" noProof="0" dirty="0" err="1" smtClean="0"/>
-              <a:t>Custom</a:t>
-            </a:r>
-            <a:r>
-              <a:rPr lang="pl-PL" noProof="0" dirty="0" smtClean="0"/>
-              <a:t> </a:t>
-            </a:r>
-            <a:r>
-              <a:rPr lang="pl-PL" dirty="0"/>
-              <a:t>e</a:t>
-            </a:r>
-            <a:r>
-              <a:rPr lang="en-US" noProof="0" dirty="0" err="1" smtClean="0"/>
-              <a:t>xplicit</a:t>
-            </a:r>
-            <a:r>
-              <a:rPr lang="en-US" noProof="0" dirty="0" smtClean="0"/>
-              <a:t> </a:t>
-            </a:r>
-            <a:r>
-              <a:rPr lang="en-US" dirty="0" smtClean="0"/>
-              <a:t>w</a:t>
-            </a:r>
-            <a:r>
-              <a:rPr lang="en-US" noProof="0" dirty="0" err="1" smtClean="0"/>
-              <a:t>ait</a:t>
-            </a:r>
-            <a:endParaRPr lang="en-US" noProof="0" dirty="0"/>
-          </a:p>
-        </p:txBody>
-      </p:sp>
-      <p:sp>
-        <p:nvSpPr>
-          <p:cNvPr id="5" name="Inhaltsplatzhalter 4"/>
-          <p:cNvSpPr>
-            <a:spLocks noGrp="1"/>
-          </p:cNvSpPr>
-          <p:nvPr>
-            <p:ph idx="1"/>
-          </p:nvPr>
-        </p:nvSpPr>
-        <p:spPr>
-          <a:xfrm>
-            <a:off x="442799" y="1119187"/>
-            <a:ext cx="8226747" cy="3362325"/>
-          </a:xfrm>
-        </p:spPr>
-        <p:txBody>
-          <a:bodyPr>
-            <a:normAutofit/>
-          </a:bodyPr>
-          <a:lstStyle/>
-          <a:p>
-            <a:pPr>
-              <a:spcBef>
-                <a:spcPts val="0"/>
-              </a:spcBef>
-              <a:spcAft>
-                <a:spcPts val="300"/>
-              </a:spcAft>
-            </a:pPr>
-            <a:r>
-              <a:rPr lang="pl-PL" altLang="de-DE" noProof="0" dirty="0" err="1" smtClean="0"/>
-              <a:t>Waiting</a:t>
-            </a:r>
-            <a:r>
-              <a:rPr lang="pl-PL" altLang="de-DE" noProof="0" dirty="0" smtClean="0"/>
-              <a:t> for element to be </a:t>
-            </a:r>
-            <a:r>
-              <a:rPr lang="pl-PL" altLang="de-DE" noProof="0" dirty="0" err="1" smtClean="0"/>
-              <a:t>visible</a:t>
-            </a:r>
-            <a:endParaRPr lang="en-US" altLang="de-DE" dirty="0" smtClean="0"/>
-          </a:p>
-          <a:p>
-            <a:pPr marL="180975" lvl="1" indent="0" defTabSz="355600">
-              <a:buNone/>
-            </a:pPr>
-            <a:r>
-              <a:rPr lang="en-US" b="1" dirty="0"/>
-              <a:t>(new </a:t>
-            </a:r>
-            <a:r>
-              <a:rPr lang="en-US" b="1" dirty="0" err="1"/>
-              <a:t>WebDriverWait</a:t>
-            </a:r>
-            <a:r>
-              <a:rPr lang="en-US" b="1" dirty="0"/>
-              <a:t>(driver, 10)).until(new </a:t>
-            </a:r>
-            <a:r>
-              <a:rPr lang="en-US" b="1" dirty="0" err="1"/>
-              <a:t>ExpectedCondition</a:t>
-            </a:r>
-            <a:r>
-              <a:rPr lang="en-US" b="1" dirty="0"/>
-              <a:t>&lt;Boolean</a:t>
-            </a:r>
-            <a:r>
-              <a:rPr lang="en-US" b="1" dirty="0" smtClean="0"/>
-              <a:t>&gt;()</a:t>
-            </a:r>
-            <a:r>
-              <a:rPr lang="pl-PL" b="1" dirty="0" smtClean="0"/>
-              <a:t> {</a:t>
-            </a:r>
-            <a:endParaRPr lang="pl-PL" b="1" dirty="0"/>
-          </a:p>
-          <a:p>
-            <a:pPr marL="180975" lvl="1" indent="0" defTabSz="355600">
-              <a:buNone/>
-            </a:pPr>
-            <a:r>
-              <a:rPr lang="pl-PL" b="1" dirty="0" smtClean="0"/>
-              <a:t>	public </a:t>
-            </a:r>
-            <a:r>
-              <a:rPr lang="pl-PL" b="1" dirty="0" err="1"/>
-              <a:t>Boolean</a:t>
-            </a:r>
-            <a:r>
-              <a:rPr lang="pl-PL" b="1" dirty="0"/>
-              <a:t> </a:t>
-            </a:r>
-            <a:r>
-              <a:rPr lang="pl-PL" b="1" dirty="0" err="1"/>
-              <a:t>apply</a:t>
-            </a:r>
-            <a:r>
-              <a:rPr lang="pl-PL" b="1" dirty="0"/>
-              <a:t>(</a:t>
-            </a:r>
-            <a:r>
-              <a:rPr lang="pl-PL" b="1" dirty="0" err="1"/>
-              <a:t>WebDriver</a:t>
-            </a:r>
-            <a:r>
-              <a:rPr lang="pl-PL" b="1" dirty="0"/>
-              <a:t> d) {</a:t>
-            </a:r>
-          </a:p>
-          <a:p>
-            <a:pPr marL="180975" lvl="1" indent="0" defTabSz="355600">
-              <a:buNone/>
-            </a:pPr>
-            <a:r>
-              <a:rPr lang="pl-PL" b="1" dirty="0" smtClean="0"/>
-              <a:t>		return </a:t>
-            </a:r>
-            <a:r>
-              <a:rPr lang="pl-PL" b="1" dirty="0" err="1"/>
-              <a:t>d.findElement</a:t>
-            </a:r>
-            <a:r>
-              <a:rPr lang="pl-PL" b="1" dirty="0"/>
-              <a:t>(By.id("page4")).</a:t>
-            </a:r>
-            <a:r>
-              <a:rPr lang="pl-PL" b="1" dirty="0" err="1"/>
-              <a:t>isDisplayed</a:t>
-            </a:r>
-            <a:r>
-              <a:rPr lang="pl-PL" b="1" dirty="0"/>
-              <a:t>();</a:t>
-            </a:r>
-          </a:p>
-          <a:p>
-            <a:pPr marL="180975" lvl="1" indent="0" defTabSz="355600">
-              <a:buNone/>
-            </a:pPr>
-            <a:r>
-              <a:rPr lang="pl-PL" b="1" dirty="0" smtClean="0"/>
-              <a:t>	}</a:t>
-            </a:r>
-          </a:p>
-          <a:p>
-            <a:pPr marL="180975" lvl="1" indent="0" defTabSz="355600">
-              <a:buNone/>
-            </a:pPr>
-            <a:r>
-              <a:rPr lang="pl-PL" b="1" dirty="0" smtClean="0"/>
-              <a:t>});</a:t>
-            </a:r>
-            <a:endParaRPr lang="pl-PL" b="1" dirty="0"/>
-          </a:p>
-          <a:p>
-            <a:pPr marL="180975" lvl="1" indent="0" defTabSz="355600">
-              <a:buNone/>
-            </a:pPr>
-            <a:endParaRPr lang="pl-PL" dirty="0" smtClean="0"/>
-          </a:p>
-          <a:p>
-            <a:pPr>
-              <a:spcBef>
-                <a:spcPts val="0"/>
-              </a:spcBef>
-              <a:spcAft>
-                <a:spcPts val="300"/>
-              </a:spcAft>
-            </a:pPr>
-            <a:r>
-              <a:rPr lang="pl-PL" altLang="de-DE" dirty="0" err="1" smtClean="0"/>
-              <a:t>Waiting</a:t>
-            </a:r>
-            <a:r>
-              <a:rPr lang="pl-PL" altLang="de-DE" dirty="0" smtClean="0"/>
-              <a:t> </a:t>
-            </a:r>
-            <a:r>
-              <a:rPr lang="pl-PL" altLang="de-DE" dirty="0"/>
-              <a:t>for </a:t>
-            </a:r>
-            <a:r>
-              <a:rPr lang="pl-PL" altLang="de-DE" dirty="0" smtClean="0"/>
-              <a:t>DOM </a:t>
-            </a:r>
-            <a:r>
-              <a:rPr lang="pl-PL" altLang="de-DE" dirty="0" err="1" smtClean="0"/>
-              <a:t>events</a:t>
-            </a:r>
-            <a:endParaRPr lang="en-US" altLang="de-DE" dirty="0"/>
-          </a:p>
-          <a:p>
-            <a:pPr marL="180975" lvl="1" indent="0" defTabSz="355600">
-              <a:buNone/>
-            </a:pPr>
-            <a:r>
-              <a:rPr lang="en-US" b="1" dirty="0"/>
-              <a:t>(new </a:t>
-            </a:r>
-            <a:r>
-              <a:rPr lang="en-US" b="1" dirty="0" err="1"/>
-              <a:t>WebDriverWait</a:t>
-            </a:r>
-            <a:r>
-              <a:rPr lang="en-US" b="1" dirty="0"/>
-              <a:t>(driver, 10)).until(new </a:t>
-            </a:r>
-            <a:r>
-              <a:rPr lang="en-US" b="1" dirty="0" err="1"/>
-              <a:t>ExpectedCondition</a:t>
-            </a:r>
-            <a:r>
-              <a:rPr lang="en-US" b="1" dirty="0"/>
-              <a:t>&lt;Boolean</a:t>
-            </a:r>
-            <a:r>
-              <a:rPr lang="en-US" b="1" dirty="0" smtClean="0"/>
-              <a:t>&gt;()</a:t>
-            </a:r>
-            <a:r>
-              <a:rPr lang="pl-PL" b="1" dirty="0" smtClean="0"/>
-              <a:t>{</a:t>
-            </a:r>
-            <a:endParaRPr lang="pl-PL" b="1" dirty="0"/>
-          </a:p>
-          <a:p>
-            <a:pPr marL="180975" lvl="1" indent="0" defTabSz="355600">
-              <a:buNone/>
-            </a:pPr>
-            <a:r>
-              <a:rPr lang="pl-PL" b="1" dirty="0" smtClean="0"/>
-              <a:t>	public </a:t>
-            </a:r>
-            <a:r>
-              <a:rPr lang="pl-PL" b="1" dirty="0" err="1"/>
-              <a:t>Boolean</a:t>
-            </a:r>
-            <a:r>
-              <a:rPr lang="pl-PL" b="1" dirty="0"/>
-              <a:t> </a:t>
-            </a:r>
-            <a:r>
-              <a:rPr lang="pl-PL" b="1" dirty="0" err="1"/>
-              <a:t>apply</a:t>
-            </a:r>
-            <a:r>
-              <a:rPr lang="pl-PL" b="1" dirty="0"/>
-              <a:t>(</a:t>
-            </a:r>
-            <a:r>
-              <a:rPr lang="pl-PL" b="1" dirty="0" err="1"/>
-              <a:t>WebDriver</a:t>
-            </a:r>
-            <a:r>
-              <a:rPr lang="pl-PL" b="1" dirty="0"/>
-              <a:t> d) {</a:t>
-            </a:r>
-          </a:p>
-          <a:p>
-            <a:pPr marL="719137" lvl="4" indent="0" defTabSz="355600">
-              <a:buNone/>
-            </a:pPr>
-            <a:r>
-              <a:rPr lang="pl-PL" b="1" dirty="0" err="1" smtClean="0"/>
-              <a:t>JavascriptExecutor</a:t>
-            </a:r>
-            <a:r>
-              <a:rPr lang="pl-PL" b="1" dirty="0" smtClean="0"/>
-              <a:t> </a:t>
-            </a:r>
-            <a:r>
-              <a:rPr lang="pl-PL" b="1" dirty="0" err="1"/>
-              <a:t>js</a:t>
-            </a:r>
-            <a:r>
-              <a:rPr lang="pl-PL" b="1" dirty="0"/>
-              <a:t> = (</a:t>
-            </a:r>
-            <a:r>
-              <a:rPr lang="pl-PL" b="1" dirty="0" err="1"/>
-              <a:t>JavascriptExecutor</a:t>
-            </a:r>
-            <a:r>
-              <a:rPr lang="pl-PL" b="1" dirty="0"/>
-              <a:t>) d;</a:t>
-            </a:r>
-          </a:p>
-          <a:p>
-            <a:pPr marL="719137" lvl="4" indent="0" defTabSz="355600">
-              <a:buNone/>
-            </a:pPr>
-            <a:r>
-              <a:rPr lang="en-US" b="1" dirty="0" smtClean="0"/>
-              <a:t>return </a:t>
-            </a:r>
-            <a:r>
-              <a:rPr lang="en-US" b="1" dirty="0"/>
-              <a:t>(Boolean)</a:t>
-            </a:r>
-            <a:r>
-              <a:rPr lang="en-US" b="1" dirty="0" err="1"/>
-              <a:t>js.executeScript</a:t>
-            </a:r>
-            <a:r>
-              <a:rPr lang="en-US" b="1" dirty="0"/>
-              <a:t>("return </a:t>
-            </a:r>
-            <a:r>
-              <a:rPr lang="en-US" b="1" dirty="0" err="1"/>
-              <a:t>jQuery.active</a:t>
-            </a:r>
-            <a:r>
-              <a:rPr lang="en-US" b="1" dirty="0"/>
-              <a:t> == 0");</a:t>
-            </a:r>
-          </a:p>
-          <a:p>
-            <a:pPr marL="180975" lvl="1" indent="0" defTabSz="355600">
-              <a:buNone/>
-            </a:pPr>
-            <a:r>
-              <a:rPr lang="pl-PL" b="1" dirty="0" smtClean="0"/>
-              <a:t>	}</a:t>
-            </a:r>
-          </a:p>
-          <a:p>
-            <a:pPr marL="180975" lvl="1" indent="0" defTabSz="355600">
-              <a:buNone/>
-            </a:pPr>
-            <a:r>
-              <a:rPr lang="pl-PL" b="1" dirty="0" smtClean="0"/>
-              <a:t>});</a:t>
-            </a:r>
-          </a:p>
-        </p:txBody>
-      </p:sp>
-      <p:sp>
-        <p:nvSpPr>
-          <p:cNvPr id="8" name="Inhaltsplatzhalter 7"/>
-          <p:cNvSpPr>
-            <a:spLocks noGrp="1"/>
-          </p:cNvSpPr>
-          <p:nvPr>
-            <p:ph type="body" sz="quarter" idx="13"/>
-          </p:nvPr>
-        </p:nvSpPr>
-        <p:spPr>
-          <a:xfrm>
-            <a:off x="451645" y="199548"/>
-            <a:ext cx="6692104" cy="123111"/>
-          </a:xfrm>
-        </p:spPr>
-        <p:txBody>
-          <a:bodyPr/>
-          <a:lstStyle/>
-          <a:p>
-            <a:r>
-              <a:rPr lang="en-US" noProof="0" dirty="0" smtClean="0"/>
-              <a:t>Selenium </a:t>
-            </a:r>
-            <a:r>
-              <a:rPr lang="en-US" noProof="0" dirty="0" err="1" smtClean="0"/>
-              <a:t>webdriver</a:t>
-            </a:r>
-            <a:endParaRPr lang="en-US" noProof="0" dirty="0"/>
-          </a:p>
-        </p:txBody>
-      </p:sp>
-    </p:spTree>
-    <p:extLst>
-      <p:ext uri="{BB962C8B-B14F-4D97-AF65-F5344CB8AC3E}">
-        <p14:creationId xmlns:p14="http://schemas.microsoft.com/office/powerpoint/2010/main" val="3874464858"/>
-      </p:ext>
-    </p:extLst>
-  </p:cSld>
-  <p:clrMapOvr>
-    <a:masterClrMapping/>
-  </p:clrMapOvr>
-  <p:timing>
-    <p:tnLst>
-      <p:par>
-        <p:cTn id="1" dur="indefinite" restart="never" nodeType="tmRoot"/>
-      </p:par>
-    </p:tnLst>
-  </p:timing>
-</p:sld>
-</file>
-
-<file path=ppt/slides/slide11.xml><?xml version="1.0" encoding="utf-8"?>
-<p:sld xmlns:a="http://schemas.openxmlformats.org/drawingml/2006/main" xmlns:r="http://schemas.openxmlformats.org/officeDocument/2006/relationships" xmlns:p="http://schemas.openxmlformats.org/presentationml/2006/main">
-  <p:cSld>
-    <p:spTree>
-      <p:nvGrpSpPr>
-        <p:cNvPr id="1" name=""/>
-        <p:cNvGrpSpPr/>
-        <p:nvPr/>
-      </p:nvGrpSpPr>
-      <p:grpSpPr>
-        <a:xfrm>
-          <a:off x="0" y="0"/>
-          <a:ext cx="0" cy="0"/>
-          <a:chOff x="0" y="0"/>
-          <a:chExt cx="0" cy="0"/>
-        </a:xfrm>
-      </p:grpSpPr>
-      <p:sp>
-        <p:nvSpPr>
-          <p:cNvPr id="6" name="Titel 5"/>
-          <p:cNvSpPr>
-            <a:spLocks noGrp="1"/>
-          </p:cNvSpPr>
-          <p:nvPr>
-            <p:ph type="title"/>
-          </p:nvPr>
-        </p:nvSpPr>
-        <p:spPr/>
-        <p:txBody>
-          <a:bodyPr/>
-          <a:lstStyle/>
-          <a:p>
-            <a:r>
               <a:rPr lang="en-US" noProof="0" dirty="0" smtClean="0"/>
               <a:t>Exercise</a:t>
             </a:r>
@@ -4905,6 +4451,37 @@
               <a:rPr lang="en-US" altLang="de-DE" dirty="0" smtClean="0"/>
               <a:t>Pay attention to fact that in each test you need to use new email address</a:t>
             </a:r>
+            <a:endParaRPr lang="pl-PL" altLang="de-DE" dirty="0" smtClean="0"/>
+          </a:p>
+          <a:p>
+            <a:pPr>
+              <a:spcBef>
+                <a:spcPts val="0"/>
+              </a:spcBef>
+              <a:spcAft>
+                <a:spcPts val="300"/>
+              </a:spcAft>
+            </a:pPr>
+            <a:r>
+              <a:rPr lang="pl-PL" altLang="de-DE" noProof="0" dirty="0" smtClean="0"/>
+              <a:t>Run test in </a:t>
+            </a:r>
+            <a:r>
+              <a:rPr lang="pl-PL" altLang="de-DE" noProof="0" dirty="0" err="1" smtClean="0"/>
+              <a:t>Firefox</a:t>
+            </a:r>
+            <a:r>
+              <a:rPr lang="pl-PL" altLang="de-DE" noProof="0" dirty="0"/>
+              <a:t> </a:t>
+            </a:r>
+            <a:r>
+              <a:rPr lang="pl-PL" altLang="de-DE" noProof="0" dirty="0" smtClean="0"/>
+              <a:t>and Chrom </a:t>
+            </a:r>
+            <a:r>
+              <a:rPr lang="pl-PL" altLang="de-DE" noProof="0" dirty="0" err="1" smtClean="0"/>
+              <a:t>browsers</a:t>
+            </a:r>
             <a:endParaRPr lang="en-US" altLang="de-DE" noProof="0" dirty="0" smtClean="0"/>
           </a:p>
           <a:p>
@@ -4967,7 +4544,7 @@
 </p:sld>
 </file>
 
-<file path=ppt/slides/slide12.xml><?xml version="1.0" encoding="utf-8"?>
+<file path=ppt/slides/slide11.xml><?xml version="1.0" encoding="utf-8"?>
 <p:sld xmlns:a="http://schemas.openxmlformats.org/drawingml/2006/main" xmlns:r="http://schemas.openxmlformats.org/officeDocument/2006/relationships" xmlns:p="http://schemas.openxmlformats.org/presentationml/2006/main">
   <p:cSld>
     <p:spTree>
@@ -5348,7 +4925,7 @@
               </a:spcAft>
               <a:buNone/>
             </a:pPr>
-            <a:endParaRPr lang="pl-PL" altLang="de-DE" sz="1100" smtClean="0"/>
+            <a:endParaRPr lang="pl-PL" altLang="de-DE" sz="1100" dirty="0" smtClean="0"/>
           </a:p>
           <a:p>
             <a:pPr marL="0" indent="0">
@@ -5376,7 +4953,6 @@
               <a:rPr lang="en-US" altLang="de-DE" sz="1100" dirty="0"/>
               <a:t>References http://www.seleniumhq.org/docs/03_webdriver.jsp</a:t>
             </a:r>
-            <a:endParaRPr lang="en-US" altLang="de-DE" sz="1100" dirty="0"/>
           </a:p>
           <a:p>
             <a:pPr marL="0" indent="0">
@@ -6512,11 +6088,7 @@
           <a:p>
             <a:r>
               <a:rPr lang="en-US" noProof="0" dirty="0" smtClean="0"/>
-              <a:t>Using </a:t>
-            </a:r>
-            <a:r>
-              <a:rPr lang="en-US" noProof="0" dirty="0" smtClean="0"/>
-              <a:t>JavaScript </a:t>
+              <a:t>Using JavaScript </a:t>
             </a:r>
             <a:endParaRPr lang="en-US" noProof="0" dirty="0"/>
           </a:p>
@@ -7558,8 +7130,24 @@
           <a:lstStyle/>
           <a:p>
             <a:r>
+              <a:rPr lang="pl-PL" noProof="0" dirty="0" err="1" smtClean="0"/>
+              <a:t>Custom</a:t>
+            </a:r>
+            <a:r>
+              <a:rPr lang="pl-PL" noProof="0" dirty="0" smtClean="0"/>
+              <a:t> </a:t>
+            </a:r>
+            <a:r>
+              <a:rPr lang="pl-PL" dirty="0"/>
+              <a:t>e</a:t>
+            </a:r>
+            <a:r>
+              <a:rPr lang="en-US" noProof="0" dirty="0" err="1" smtClean="0"/>
+              <a:t>xplicit</a:t>
+            </a:r>
+            <a:r>
               <a:rPr lang="en-US" noProof="0" dirty="0" smtClean="0"/>
-              <a:t>Explicit </a:t>
+              <a:t> </a:t>
             </a:r>
             <a:r>
               <a:rPr lang="en-US" dirty="0" smtClean="0"/>
@@ -7567,7 +7155,7 @@
             </a:r>
             <a:r>
               <a:rPr lang="en-US" noProof="0" dirty="0" err="1" smtClean="0"/>
-              <a:t>aits</a:t>
+              <a:t>ait</a:t>
             </a:r>
             <a:endParaRPr lang="en-US" noProof="0" dirty="0"/>
           </a:p>
@@ -7604,146 +7192,309 @@
               </a:spcAft>
             </a:pPr>
             <a:r>
-              <a:rPr lang="en-US" altLang="de-DE" noProof="0" dirty="0" smtClean="0"/>
-              <a:t>Explicit waits polls DOM every 500 to check if condition is fulfilled.</a:t>
+              <a:rPr lang="pl-PL" altLang="de-DE" noProof="0" dirty="0" err="1" smtClean="0"/>
+              <a:t>Waiting</a:t>
+            </a:r>
+            <a:r>
+              <a:rPr lang="pl-PL" altLang="de-DE" noProof="0" dirty="0" smtClean="0"/>
+              <a:t> for element to be </a:t>
+            </a:r>
+            <a:r>
+              <a:rPr lang="pl-PL" altLang="de-DE" noProof="0" dirty="0" err="1" smtClean="0"/>
+              <a:t>visible</a:t>
             </a:r>
             <a:endParaRPr lang="en-US" altLang="de-DE" dirty="0" smtClean="0"/>
           </a:p>
           <a:p>
-            <a:pPr marL="0" indent="0">
-              <a:buNone/>
-            </a:pPr>
-            <a:r>
-              <a:rPr lang="en-US" dirty="0" err="1" smtClean="0"/>
+            <a:pPr marL="180975" lvl="1" indent="0" defTabSz="355600">
+              <a:buNone/>
+            </a:pPr>
+            <a:r>
+              <a:rPr lang="en-US" b="1" dirty="0"/>
+              <a:t>(new </a:t>
+            </a:r>
+            <a:r>
+              <a:rPr lang="en-US" b="1" dirty="0" err="1"/>
               <a:t>WebDriverWait</a:t>
             </a:r>
             <a:r>
-              <a:rPr lang="en-US" dirty="0" smtClean="0"/>
-              <a:t> wait = new </a:t>
-            </a:r>
-            <a:r>
-              <a:rPr lang="en-US" dirty="0" err="1" smtClean="0"/>
+              <a:rPr lang="en-US" b="1" dirty="0"/>
+              <a:t>(driver, 10)).until(new </a:t>
+            </a:r>
+            <a:r>
+              <a:rPr lang="en-US" b="1" dirty="0" err="1"/>
+              <a:t>ExpectedCondition</a:t>
+            </a:r>
+            <a:r>
+              <a:rPr lang="en-US" b="1" dirty="0"/>
+              <a:t>&lt;Boolean</a:t>
+            </a:r>
+            <a:r>
+              <a:rPr lang="en-US" b="1" dirty="0" smtClean="0"/>
+              <a:t>&gt;()</a:t>
+            </a:r>
+            <a:r>
+              <a:rPr lang="pl-PL" b="1" dirty="0" smtClean="0"/>
+              <a:t> {</a:t>
+            </a:r>
+            <a:endParaRPr lang="pl-PL" b="1" dirty="0"/>
+          </a:p>
+          <a:p>
+            <a:pPr marL="180975" lvl="1" indent="0" defTabSz="355600">
+              <a:buNone/>
+            </a:pPr>
+            <a:r>
+              <a:rPr lang="pl-PL" b="1" dirty="0" smtClean="0"/>
+              <a:t>	public </a:t>
+            </a:r>
+            <a:r>
+              <a:rPr lang="pl-PL" b="1" dirty="0" err="1"/>
+              <a:t>Boolean</a:t>
+            </a:r>
+            <a:r>
+              <a:rPr lang="pl-PL" b="1" dirty="0"/>
+              <a:t> </a:t>
+            </a:r>
+            <a:r>
+              <a:rPr lang="pl-PL" b="1" dirty="0" err="1"/>
+              <a:t>apply</a:t>
+            </a:r>
+            <a:r>
+              <a:rPr lang="pl-PL" b="1" dirty="0"/>
+              <a:t>(</a:t>
+            </a:r>
+            <a:r>
+              <a:rPr lang="pl-PL" b="1" dirty="0" err="1"/>
+              <a:t>WebDriver</a:t>
+            </a:r>
+            <a:r>
+              <a:rPr lang="pl-PL" b="1" dirty="0"/>
+              <a:t> d) {</a:t>
+            </a:r>
+          </a:p>
+          <a:p>
+            <a:pPr marL="180975" lvl="1" indent="0" defTabSz="355600">
+              <a:buNone/>
+            </a:pPr>
+            <a:r>
+              <a:rPr lang="pl-PL" b="1" dirty="0" smtClean="0"/>
+              <a:t>		return </a:t>
+            </a:r>
+            <a:r>
+              <a:rPr lang="pl-PL" b="1" dirty="0" err="1"/>
+              <a:t>d.findElement</a:t>
+            </a:r>
+            <a:r>
+              <a:rPr lang="pl-PL" b="1" dirty="0"/>
+              <a:t>(By.id("page4")).</a:t>
+            </a:r>
+            <a:r>
+              <a:rPr lang="pl-PL" b="1" dirty="0" err="1"/>
+              <a:t>isDisplayed</a:t>
+            </a:r>
+            <a:r>
+              <a:rPr lang="pl-PL" b="1" dirty="0"/>
+              <a:t>();</a:t>
+            </a:r>
+          </a:p>
+          <a:p>
+            <a:pPr marL="180975" lvl="1" indent="0" defTabSz="355600">
+              <a:buNone/>
+            </a:pPr>
+            <a:r>
+              <a:rPr lang="pl-PL" b="1" dirty="0" smtClean="0"/>
+              <a:t>	}</a:t>
+            </a:r>
+          </a:p>
+          <a:p>
+            <a:pPr marL="180975" lvl="1" indent="0" defTabSz="355600">
+              <a:buNone/>
+            </a:pPr>
+            <a:r>
+              <a:rPr lang="pl-PL" b="1" dirty="0" smtClean="0"/>
+              <a:t>});</a:t>
+            </a:r>
+            <a:endParaRPr lang="pl-PL" b="1" dirty="0"/>
+          </a:p>
+          <a:p>
+            <a:pPr marL="180975" lvl="1" indent="0" defTabSz="355600">
+              <a:buNone/>
+            </a:pPr>
+            <a:endParaRPr lang="pl-PL" dirty="0" smtClean="0"/>
+          </a:p>
+          <a:p>
+            <a:pPr>
+              <a:spcBef>
+                <a:spcPts val="0"/>
+              </a:spcBef>
+              <a:spcAft>
+                <a:spcPts val="300"/>
+              </a:spcAft>
+            </a:pPr>
+            <a:r>
+              <a:rPr lang="pl-PL" altLang="de-DE" dirty="0" err="1" smtClean="0"/>
+              <a:t>Waiting</a:t>
+            </a:r>
+            <a:r>
+              <a:rPr lang="pl-PL" altLang="de-DE" dirty="0" smtClean="0"/>
+              <a:t> </a:t>
+            </a:r>
+            <a:r>
+              <a:rPr lang="pl-PL" altLang="de-DE" dirty="0"/>
+              <a:t>for </a:t>
+            </a:r>
+            <a:r>
+              <a:rPr lang="pl-PL" altLang="de-DE" dirty="0" smtClean="0"/>
+              <a:t>DOM </a:t>
+            </a:r>
+            <a:r>
+              <a:rPr lang="pl-PL" altLang="de-DE" dirty="0" err="1" smtClean="0"/>
+              <a:t>events</a:t>
+            </a:r>
+            <a:endParaRPr lang="en-US" altLang="de-DE" dirty="0"/>
+          </a:p>
+          <a:p>
+            <a:pPr marL="180975" lvl="1" indent="0" defTabSz="355600">
+              <a:buNone/>
+            </a:pPr>
+            <a:r>
+              <a:rPr lang="en-US" b="1" dirty="0"/>
+              <a:t>(new </a:t>
+            </a:r>
+            <a:r>
+              <a:rPr lang="en-US" b="1" dirty="0" err="1"/>
               <a:t>WebDriverWait</a:t>
             </a:r>
             <a:r>
-              <a:rPr lang="en-US" dirty="0" smtClean="0"/>
-              <a:t>(driver, 10);</a:t>
-            </a:r>
-          </a:p>
-          <a:p>
-            <a:pPr marL="0" indent="0">
-              <a:buNone/>
-            </a:pPr>
-            <a:r>
-              <a:rPr lang="en-US" dirty="0" err="1" smtClean="0"/>
-              <a:t>wait.until</a:t>
-            </a:r>
-            <a:r>
-              <a:rPr lang="en-US" dirty="0" smtClean="0"/>
+              <a:rPr lang="en-US" b="1" dirty="0"/>
+              <a:t>(driver, 10)).until(new </a:t>
+            </a:r>
+            <a:r>
+              <a:rPr lang="en-US" b="1" dirty="0" err="1"/>
+              <a:t>ExpectedCondition</a:t>
+            </a:r>
+            <a:r>
+              <a:rPr lang="en-US" b="1" dirty="0"/>
+              <a:t>&lt;Boolean</a:t>
+            </a:r>
+            <a:r>
+              <a:rPr lang="en-US" b="1" dirty="0" smtClean="0"/>
+              <a:t>&gt;()</a:t>
+            </a:r>
+            <a:r>
+              <a:rPr lang="pl-PL" b="1" dirty="0" smtClean="0"/>
+              <a:t>{</a:t>
+            </a:r>
+            <a:endParaRPr lang="pl-PL" b="1" dirty="0"/>
+          </a:p>
+          <a:p>
+            <a:pPr marL="180975" lvl="1" indent="0" defTabSz="355600">
+              <a:buNone/>
+            </a:pPr>
+            <a:r>
+              <a:rPr lang="pl-PL" b="1" dirty="0" smtClean="0"/>
+              <a:t>	public </a:t>
+            </a:r>
+            <a:r>
+              <a:rPr lang="pl-PL" b="1" dirty="0" err="1"/>
+              <a:t>Boolean</a:t>
+            </a:r>
+            <a:r>
+              <a:rPr lang="pl-PL" b="1" dirty="0"/>
+              <a:t> </a:t>
+            </a:r>
+            <a:r>
+              <a:rPr lang="pl-PL" b="1" dirty="0" err="1"/>
+              <a:t>apply</a:t>
+            </a:r>
+            <a:r>
+              <a:rPr lang="pl-PL" b="1" dirty="0"/>
               <a:t>(</a:t>
             </a:r>
             <a:r>
-              <a:rPr lang="en-US" dirty="0" err="1" smtClean="0"/>
-              <a:t>ExpectedConditions.titleContains</a:t>
-            </a:r>
-            <a:r>
-              <a:rPr lang="en-US" dirty="0" smtClean="0"/>
-              <a:t>("selenium"));</a:t>
-            </a:r>
-          </a:p>
-          <a:p>
-            <a:endParaRPr lang="en-US" altLang="de-DE" noProof="0" dirty="0" smtClean="0"/>
-          </a:p>
-          <a:p>
-            <a:r>
-              <a:rPr lang="en-US" altLang="de-DE" dirty="0" smtClean="0"/>
-              <a:t>Other </a:t>
-            </a:r>
-            <a:r>
-              <a:rPr lang="en-US" altLang="de-DE" dirty="0" err="1" smtClean="0"/>
-              <a:t>ExpectedConditions</a:t>
-            </a:r>
-            <a:endParaRPr lang="en-US" altLang="de-DE" dirty="0" smtClean="0"/>
-          </a:p>
-          <a:p>
-            <a:pPr lvl="1"/>
-            <a:r>
-              <a:rPr lang="en-US" dirty="0" err="1" smtClean="0"/>
-              <a:t>elementToBeClickable</a:t>
-            </a:r>
-            <a:r>
-              <a:rPr lang="en-US" dirty="0" smtClean="0"/>
-              <a:t>(By locator)</a:t>
-            </a:r>
-          </a:p>
-          <a:p>
-            <a:pPr lvl="1"/>
-            <a:r>
-              <a:rPr lang="en-US" dirty="0" err="1" smtClean="0"/>
-              <a:t>elementToBeSelected</a:t>
-            </a:r>
-            <a:r>
-              <a:rPr lang="en-US" dirty="0" smtClean="0"/>
-              <a:t>(</a:t>
-            </a:r>
-            <a:r>
-              <a:rPr lang="en-US" dirty="0" err="1" smtClean="0"/>
-              <a:t>WebElement</a:t>
-            </a:r>
-            <a:r>
-              <a:rPr lang="en-US" dirty="0" smtClean="0"/>
-              <a:t> element)</a:t>
-            </a:r>
-          </a:p>
-          <a:p>
-            <a:pPr lvl="1"/>
-            <a:r>
-              <a:rPr lang="en-US" dirty="0" err="1" smtClean="0"/>
-              <a:t>presenceOfElementLocated</a:t>
-            </a:r>
-            <a:r>
-              <a:rPr lang="en-US" dirty="0" smtClean="0"/>
-              <a:t>(By locator)</a:t>
-            </a:r>
-          </a:p>
-          <a:p>
-            <a:pPr lvl="1"/>
-            <a:r>
-              <a:rPr lang="en-US" dirty="0" err="1" smtClean="0"/>
-              <a:t>textToBePresentInElement</a:t>
-            </a:r>
-            <a:r>
-              <a:rPr lang="en-US" dirty="0" smtClean="0"/>
-              <a:t>(By locator, </a:t>
-            </a:r>
-            <a:r>
-              <a:rPr lang="en-US" dirty="0" err="1" smtClean="0"/>
-              <a:t>java.lang.String</a:t>
-            </a:r>
-            <a:r>
-              <a:rPr lang="en-US" dirty="0" smtClean="0"/>
-              <a:t> text)</a:t>
-            </a:r>
-          </a:p>
-          <a:p>
-            <a:pPr lvl="1"/>
-            <a:r>
-              <a:rPr lang="en-US" dirty="0" err="1" smtClean="0"/>
-              <a:t>textToBePresentInElementValue</a:t>
-            </a:r>
-            <a:r>
-              <a:rPr lang="en-US" dirty="0" smtClean="0"/>
-              <a:t>(By locator, </a:t>
-            </a:r>
-            <a:r>
-              <a:rPr lang="en-US" dirty="0" err="1" smtClean="0"/>
-              <a:t>java.lang.String</a:t>
-            </a:r>
-            <a:r>
-              <a:rPr lang="en-US" dirty="0" smtClean="0"/>
-              <a:t> text)</a:t>
-            </a:r>
-            <a:endParaRPr lang="en-US" dirty="0"/>
+              <a:rPr lang="pl-PL" b="1" dirty="0" err="1"/>
+              <a:t>WebDriver</a:t>
+            </a:r>
+            <a:r>
+              <a:rPr lang="pl-PL" b="1" dirty="0"/>
+              <a:t> d) {</a:t>
+            </a:r>
+          </a:p>
+          <a:p>
+            <a:pPr marL="719137" lvl="4" indent="0" defTabSz="355600">
+              <a:buNone/>
+            </a:pPr>
+            <a:r>
+              <a:rPr lang="pl-PL" b="1" dirty="0" err="1" smtClean="0"/>
+              <a:t>JavascriptExecutor</a:t>
+            </a:r>
+            <a:r>
+              <a:rPr lang="pl-PL" b="1" dirty="0" smtClean="0"/>
+              <a:t> </a:t>
+            </a:r>
+            <a:r>
+              <a:rPr lang="pl-PL" b="1" dirty="0" err="1"/>
+              <a:t>js</a:t>
+            </a:r>
+            <a:r>
+              <a:rPr lang="pl-PL" b="1" dirty="0"/>
+              <a:t> = (</a:t>
+            </a:r>
+            <a:r>
+              <a:rPr lang="pl-PL" b="1" dirty="0" err="1"/>
+              <a:t>JavascriptExecutor</a:t>
+            </a:r>
+            <a:r>
+              <a:rPr lang="pl-PL" b="1" dirty="0"/>
+              <a:t>) d;</a:t>
+            </a:r>
+          </a:p>
+          <a:p>
+            <a:pPr marL="719137" lvl="4" indent="0" defTabSz="355600">
+              <a:buNone/>
+            </a:pPr>
+            <a:r>
+              <a:rPr lang="en-US" b="1" dirty="0" smtClean="0"/>
+              <a:t>return </a:t>
+            </a:r>
+            <a:r>
+              <a:rPr lang="en-US" b="1" dirty="0"/>
+              <a:t>(Boolean)</a:t>
+            </a:r>
+            <a:r>
+              <a:rPr lang="en-US" b="1" dirty="0" err="1"/>
+              <a:t>js.executeScript</a:t>
+            </a:r>
+            <a:r>
+              <a:rPr lang="en-US" b="1" dirty="0"/>
+              <a:t>("return </a:t>
+            </a:r>
+            <a:r>
+              <a:rPr lang="en-US" b="1" dirty="0" err="1"/>
+              <a:t>jQuery.active</a:t>
+            </a:r>
+            <a:r>
+              <a:rPr lang="en-US" b="1" dirty="0"/>
+              <a:t> == 0");</a:t>
+            </a:r>
+          </a:p>
+          <a:p>
+            <a:pPr marL="180975" lvl="1" indent="0" defTabSz="355600">
+              <a:buNone/>
+            </a:pPr>
+            <a:r>
+              <a:rPr lang="pl-PL" b="1" dirty="0" smtClean="0"/>
+              <a:t>	}</a:t>
+            </a:r>
+          </a:p>
+          <a:p>
+            <a:pPr marL="180975" lvl="1" indent="0" defTabSz="355600">
+              <a:buNone/>
+            </a:pPr>
+            <a:r>
+              <a:rPr lang="pl-PL" b="1" dirty="0" smtClean="0"/>
+              <a:t>});</a:t>
+            </a:r>
           </a:p>
         </p:txBody>
       </p:sp>
@@ -7782,7 +7533,7 @@
     </p:spTree>
     <p:extLst>
       <p:ext uri="{BB962C8B-B14F-4D97-AF65-F5344CB8AC3E}">
-        <p14:creationId xmlns:p14="http://schemas.microsoft.com/office/powerpoint/2010/main" val="3310145675"/>
+        <p14:creationId xmlns:p14="http://schemas.microsoft.com/office/powerpoint/2010/main" val="3874464858"/>
       </p:ext>
     </p:extLst>
   </p:cSld>
@@ -8776,50 +8527,6 @@
 </file>
 
 <file path=customXml/item2.xml><?xml version="1.0" encoding="utf-8"?>
-<p:properties xmlns:p="http://schemas.microsoft.com/office/2006/metadata/properties" xmlns:xsi="http://www.w3.org/2001/XMLSchema-instance" xmlns:pc="http://schemas.microsoft.com/office/infopath/2007/PartnerControls">
-  <documentManagement>
-    <_dlc_DocId xmlns="727178e8-9586-4f49-8e7b-77af9c2fb085">CVD5QAC74SYH-2-13943</_dlc_DocId>
-    <_dlc_DocIdUrl xmlns="727178e8-9586-4f49-8e7b-77af9c2fb085">
-      <Url>https://share.gft.com/sites/Corporate-Marketing/_layouts/DocIdRedir.aspx?ID=CVD5QAC74SYH-2-13943</Url>
-      <Description>CVD5QAC74SYH-2-13943</Description>
-    </_dlc_DocIdUrl>
-    <Functional_x0020_Area xmlns="e44e039f-c551-4112-981c-456f1b630ef1">Functional Area 1</Functional_x0020_Area>
-    <Reference_x0020_Title xmlns="e44e039f-c551-4112-981c-456f1b630ef1" xsi:nil="true"/>
-    <Area xmlns="e44e039f-c551-4112-981c-456f1b630ef1">Area 1</Area>
-    <Project_x0020_size_x0020__x0028_resources_x0029_ xmlns="e44e039f-c551-4112-981c-456f1b630ef1" xsi:nil="true"/>
-    <Comments xmlns="e44e039f-c551-4112-981c-456f1b630ef1" xsi:nil="true"/>
-    <Business_x0020_Sector xmlns="e44e039f-c551-4112-981c-456f1b630ef1">Banking</Business_x0020_Sector>
-    <Client_x0020_Category xmlns="e44e039f-c551-4112-981c-456f1b630ef1">Central</Client_x0020_Category>
-    <Methods_x0020_and_x0020_standards xmlns="e44e039f-c551-4112-981c-456f1b630ef1" xsi:nil="true"/>
-    <Responsible xmlns="e44e039f-c551-4112-981c-456f1b630ef1" xsi:nil="true"/>
-    <Client_x0020_Name xmlns="e44e039f-c551-4112-981c-456f1b630ef1" xsi:nil="true"/>
-    <Client_x0020_approval xmlns="e44e039f-c551-4112-981c-456f1b630ef1">No</Client_x0020_approval>
-    <Plattform_x0020__x0026__x0020_tools xmlns="e44e039f-c551-4112-981c-456f1b630ef1" xsi:nil="true"/>
-    <Project_x0020_ID xmlns="e44e039f-c551-4112-981c-456f1b630ef1" xsi:nil="true"/>
-    <Description0 xmlns="e44e039f-c551-4112-981c-456f1b630ef1" xsi:nil="true"/>
-    <Author_x0020__x002f__x0020_Contact xmlns="e44e039f-c551-4112-981c-456f1b630ef1">
-      <UserInfo>
-        <DisplayName/>
-        <AccountId xsi:nil="true"/>
-        <AccountType/>
-      </UserInfo>
-    </Author_x0020__x002f__x0020_Contact>
-    <Client_x0020_Country xmlns="e44e039f-c551-4112-981c-456f1b630ef1">Germany</Client_x0020_Country>
-    <Year xmlns="e44e039f-c551-4112-981c-456f1b630ef1" xsi:nil="true"/>
-  </documentManagement>
-</p:properties>
-</file>
-
-<file path=customXml/item3.xml><?xml version="1.0" encoding="utf-8"?>
-<?mso-contentType ?>
-<FormTemplates xmlns="http://schemas.microsoft.com/sharepoint/v3/contenttype/forms">
-  <Display>DocumentLibraryForm</Display>
-  <Edit>DocumentLibraryForm</Edit>
-  <New>DocumentLibraryForm</New>
-</FormTemplates>
-</file>
-
-<file path=customXml/item4.xml><?xml version="1.0" encoding="utf-8"?>
 <ct:contentTypeSchema xmlns:ct="http://schemas.microsoft.com/office/2006/metadata/contentType" xmlns:ma="http://schemas.microsoft.com/office/2006/metadata/properties/metaAttributes" ct:_="" ma:_="" ma:contentTypeName="Document" ma:contentTypeID="0x010100793B9935CA02AD4F90F0A0FD564FDD82" ma:contentTypeVersion="17" ma:contentTypeDescription="Create a new document." ma:contentTypeScope="" ma:versionID="6168266ad0b2c1ccdc9d2ae0268a5eb6">
   <xsd:schema xmlns:xsd="http://www.w3.org/2001/XMLSchema" xmlns:xs="http://www.w3.org/2001/XMLSchema" xmlns:p="http://schemas.microsoft.com/office/2006/metadata/properties" xmlns:ns2="e44e039f-c551-4112-981c-456f1b630ef1" xmlns:ns3="727178e8-9586-4f49-8e7b-77af9c2fb085" targetNamespace="http://schemas.microsoft.com/office/2006/metadata/properties" ma:root="true" ma:fieldsID="b9b29daf9bb73cd90369de1b0e977594" ns2:_="" ns3:_="">
     <xsd:import namespace="e44e039f-c551-4112-981c-456f1b630ef1"/>
@@ -9316,6 +9023,50 @@
 </ct:contentTypeSchema>
 </file>
 
+<file path=customXml/item3.xml><?xml version="1.0" encoding="utf-8"?>
+<?mso-contentType ?>
+<FormTemplates xmlns="http://schemas.microsoft.com/sharepoint/v3/contenttype/forms">
+  <Display>DocumentLibraryForm</Display>
+  <Edit>DocumentLibraryForm</Edit>
+  <New>DocumentLibraryForm</New>
+</FormTemplates>
+</file>
+
+<file path=customXml/item4.xml><?xml version="1.0" encoding="utf-8"?>
+<p:properties xmlns:p="http://schemas.microsoft.com/office/2006/metadata/properties" xmlns:xsi="http://www.w3.org/2001/XMLSchema-instance" xmlns:pc="http://schemas.microsoft.com/office/infopath/2007/PartnerControls">
+  <documentManagement>
+    <_dlc_DocId xmlns="727178e8-9586-4f49-8e7b-77af9c2fb085">CVD5QAC74SYH-2-13943</_dlc_DocId>
+    <_dlc_DocIdUrl xmlns="727178e8-9586-4f49-8e7b-77af9c2fb085">
+      <Url>https://share.gft.com/sites/Corporate-Marketing/_layouts/DocIdRedir.aspx?ID=CVD5QAC74SYH-2-13943</Url>
+      <Description>CVD5QAC74SYH-2-13943</Description>
+    </_dlc_DocIdUrl>
+    <Functional_x0020_Area xmlns="e44e039f-c551-4112-981c-456f1b630ef1">Functional Area 1</Functional_x0020_Area>
+    <Reference_x0020_Title xmlns="e44e039f-c551-4112-981c-456f1b630ef1" xsi:nil="true"/>
+    <Area xmlns="e44e039f-c551-4112-981c-456f1b630ef1">Area 1</Area>
+    <Project_x0020_size_x0020__x0028_resources_x0029_ xmlns="e44e039f-c551-4112-981c-456f1b630ef1" xsi:nil="true"/>
+    <Comments xmlns="e44e039f-c551-4112-981c-456f1b630ef1" xsi:nil="true"/>
+    <Business_x0020_Sector xmlns="e44e039f-c551-4112-981c-456f1b630ef1">Banking</Business_x0020_Sector>
+    <Client_x0020_Category xmlns="e44e039f-c551-4112-981c-456f1b630ef1">Central</Client_x0020_Category>
+    <Methods_x0020_and_x0020_standards xmlns="e44e039f-c551-4112-981c-456f1b630ef1" xsi:nil="true"/>
+    <Responsible xmlns="e44e039f-c551-4112-981c-456f1b630ef1" xsi:nil="true"/>
+    <Client_x0020_Name xmlns="e44e039f-c551-4112-981c-456f1b630ef1" xsi:nil="true"/>
+    <Client_x0020_approval xmlns="e44e039f-c551-4112-981c-456f1b630ef1">No</Client_x0020_approval>
+    <Plattform_x0020__x0026__x0020_tools xmlns="e44e039f-c551-4112-981c-456f1b630ef1" xsi:nil="true"/>
+    <Project_x0020_ID xmlns="e44e039f-c551-4112-981c-456f1b630ef1" xsi:nil="true"/>
+    <Description0 xmlns="e44e039f-c551-4112-981c-456f1b630ef1" xsi:nil="true"/>
+    <Author_x0020__x002f__x0020_Contact xmlns="e44e039f-c551-4112-981c-456f1b630ef1">
+      <UserInfo>
+        <DisplayName/>
+        <AccountId xsi:nil="true"/>
+        <AccountType/>
+      </UserInfo>
+    </Author_x0020__x002f__x0020_Contact>
+    <Client_x0020_Country xmlns="e44e039f-c551-4112-981c-456f1b630ef1">Germany</Client_x0020_Country>
+    <Year xmlns="e44e039f-c551-4112-981c-456f1b630ef1" xsi:nil="true"/>
+  </documentManagement>
+</p:properties>
+</file>
+
 <file path=customXml/itemProps1.xml><?xml version="1.0" encoding="utf-8"?>
 <ds:datastoreItem xmlns:ds="http://schemas.openxmlformats.org/officeDocument/2006/customXml" ds:itemID="{A6F3EA8F-EBA0-438A-80BD-6A96E2E10054}">
   <ds:schemaRefs>
@@ -9325,31 +9076,6 @@
 </file>
 
 <file path=customXml/itemProps2.xml><?xml version="1.0" encoding="utf-8"?>
-<ds:datastoreItem xmlns:ds="http://schemas.openxmlformats.org/officeDocument/2006/customXml" ds:itemID="{7445AAF4-B73F-4E3A-B9D2-4DDAE0F1BE8A}">
-  <ds:schemaRefs>
-    <ds:schemaRef ds:uri="http://purl.org/dc/elements/1.1/"/>
-    <ds:schemaRef ds:uri="http://schemas.microsoft.com/office/2006/metadata/properties"/>
-    <ds:schemaRef ds:uri="http://purl.org/dc/terms/"/>
-    <ds:schemaRef ds:uri="http://schemas.openxmlformats.org/package/2006/metadata/core-properties"/>
-    <ds:schemaRef ds:uri="727178e8-9586-4f49-8e7b-77af9c2fb085"/>
-    <ds:schemaRef ds:uri="http://schemas.microsoft.com/office/2006/documentManagement/types"/>
-    <ds:schemaRef ds:uri="http://schemas.microsoft.com/office/infopath/2007/PartnerControls"/>
-    <ds:schemaRef ds:uri="e44e039f-c551-4112-981c-456f1b630ef1"/>
-    <ds:schemaRef ds:uri="http://www.w3.org/XML/1998/namespace"/>
-    <ds:schemaRef ds:uri="http://purl.org/dc/dcmitype/"/>
-  </ds:schemaRefs>
-</ds:datastoreItem>
-</file>
-
-<file path=customXml/itemProps3.xml><?xml version="1.0" encoding="utf-8"?>
-<ds:datastoreItem xmlns:ds="http://schemas.openxmlformats.org/officeDocument/2006/customXml" ds:itemID="{9217953E-6BB7-40C6-9A84-608D0A8D65EC}">
-  <ds:schemaRefs>
-    <ds:schemaRef ds:uri="http://schemas.microsoft.com/sharepoint/v3/contenttype/forms"/>
-  </ds:schemaRefs>
-</ds:datastoreItem>
-</file>
-
-<file path=customXml/itemProps4.xml><?xml version="1.0" encoding="utf-8"?>
 <ds:datastoreItem xmlns:ds="http://schemas.openxmlformats.org/officeDocument/2006/customXml" ds:itemID="{54CA1130-EAC1-4116-82E4-DF5A51FE3AEA}">
   <ds:schemaRefs>
     <ds:schemaRef ds:uri="http://schemas.microsoft.com/office/2006/metadata/contentType"/>
@@ -9366,4 +9092,29 @@
     <ds:schemaRef ds:uri="http://schemas.microsoft.com/internal/obd"/>
   </ds:schemaRefs>
 </ds:datastoreItem>
+</file>
+
+<file path=customXml/itemProps3.xml><?xml version="1.0" encoding="utf-8"?>
+<ds:datastoreItem xmlns:ds="http://schemas.openxmlformats.org/officeDocument/2006/customXml" ds:itemID="{9217953E-6BB7-40C6-9A84-608D0A8D65EC}">
+  <ds:schemaRefs>
+    <ds:schemaRef ds:uri="http://schemas.microsoft.com/sharepoint/v3/contenttype/forms"/>
+  </ds:schemaRefs>
+</ds:datastoreItem>
+</file>
+
+<file path=customXml/itemProps4.xml><?xml version="1.0" encoding="utf-8"?>
+<ds:datastoreItem xmlns:ds="http://schemas.openxmlformats.org/officeDocument/2006/customXml" ds:itemID="{7445AAF4-B73F-4E3A-B9D2-4DDAE0F1BE8A}">
+  <ds:schemaRefs>
+    <ds:schemaRef ds:uri="http://purl.org/dc/elements/1.1/"/>
+    <ds:schemaRef ds:uri="http://schemas.microsoft.com/office/2006/metadata/properties"/>
+    <ds:schemaRef ds:uri="http://purl.org/dc/terms/"/>
+    <ds:schemaRef ds:uri="http://schemas.openxmlformats.org/package/2006/metadata/core-properties"/>
+    <ds:schemaRef ds:uri="727178e8-9586-4f49-8e7b-77af9c2fb085"/>
+    <ds:schemaRef ds:uri="http://schemas.microsoft.com/office/2006/documentManagement/types"/>
+    <ds:schemaRef ds:uri="http://schemas.microsoft.com/office/infopath/2007/PartnerControls"/>
+    <ds:schemaRef ds:uri="e44e039f-c551-4112-981c-456f1b630ef1"/>
+    <ds:schemaRef ds:uri="http://www.w3.org/XML/1998/namespace"/>
+    <ds:schemaRef ds:uri="http://purl.org/dc/dcmitype/"/>
+  </ds:schemaRefs>
+</ds:datastoreItem>
 </file>
</xml_diff>